<commit_message>
More work on growth fitting and comparisons.
</commit_message>
<xml_diff>
--- a/Slides/04_Growth.pptx
+++ b/Slides/04_Growth.pptx
@@ -17,10 +17,10 @@
     <p:sldId id="316" r:id="rId5"/>
     <p:sldId id="315" r:id="rId6"/>
     <p:sldId id="336" r:id="rId7"/>
-    <p:sldId id="335" r:id="rId8"/>
-    <p:sldId id="337" r:id="rId9"/>
-    <p:sldId id="338" r:id="rId10"/>
-    <p:sldId id="339" r:id="rId11"/>
+    <p:sldId id="339" r:id="rId8"/>
+    <p:sldId id="335" r:id="rId9"/>
+    <p:sldId id="337" r:id="rId10"/>
+    <p:sldId id="338" r:id="rId11"/>
   </p:sldIdLst>
   <p:sldSz cx="9144000" cy="6858000" type="screen4x3"/>
   <p:notesSz cx="6858000" cy="9190038"/>
@@ -4214,40 +4214,109 @@
             </a:r>
             <a:r>
               <a:rPr lang="en-US" dirty="0" smtClean="0"/>
-              <a:t>– Other Versions</a:t>
+              <a:t>– Francis</a:t>
             </a:r>
             <a:endParaRPr lang="en-US" dirty="0"/>
           </a:p>
         </p:txBody>
       </p:sp>
-      <p:pic>
-        <p:nvPicPr>
-          <p:cNvPr id="3" name="Picture 2"/>
-          <p:cNvPicPr>
-            <a:picLocks noChangeAspect="1"/>
-          </p:cNvPicPr>
-          <p:nvPr/>
-        </p:nvPicPr>
-        <p:blipFill>
-          <a:blip r:embed="rId2"/>
-          <a:stretch>
-            <a:fillRect/>
-          </a:stretch>
-        </p:blipFill>
+      <p:sp>
+        <p:nvSpPr>
+          <p:cNvPr id="418819" name="Rectangle 3"/>
+          <p:cNvSpPr>
+            <a:spLocks noGrp="1" noChangeArrowheads="1"/>
+          </p:cNvSpPr>
+          <p:nvPr>
+            <p:ph type="body" idx="1"/>
+          </p:nvPr>
+        </p:nvSpPr>
         <p:spPr>
           <a:xfrm>
-            <a:off x="77094" y="1371600"/>
-            <a:ext cx="8989811" cy="4114799"/>
+            <a:off x="65088" y="1066800"/>
+            <a:ext cx="9078912" cy="5562600"/>
           </a:xfrm>
-          <a:prstGeom prst="rect">
-            <a:avLst/>
-          </a:prstGeom>
         </p:spPr>
-      </p:pic>
+        <p:txBody>
+          <a:bodyPr/>
+          <a:lstStyle/>
+          <a:p>
+            <a:pPr>
+              <a:lnSpc>
+                <a:spcPct val="90000"/>
+              </a:lnSpc>
+            </a:pPr>
+            <a:r>
+              <a:rPr lang="en-US" dirty="0"/>
+              <a:t> </a:t>
+            </a:r>
+            <a:r>
+              <a:rPr lang="en-US" dirty="0" smtClean="0"/>
+              <a:t>A </a:t>
+            </a:r>
+            <a:r>
+              <a:rPr lang="en-US" dirty="0" err="1" smtClean="0"/>
+              <a:t>reparameterization</a:t>
+            </a:r>
+            <a:endParaRPr lang="en-US" dirty="0" smtClean="0"/>
+          </a:p>
+          <a:p>
+            <a:pPr>
+              <a:lnSpc>
+                <a:spcPct val="90000"/>
+              </a:lnSpc>
+            </a:pPr>
+            <a:endParaRPr lang="en-US" dirty="0"/>
+          </a:p>
+          <a:p>
+            <a:pPr>
+              <a:lnSpc>
+                <a:spcPct val="90000"/>
+              </a:lnSpc>
+            </a:pPr>
+            <a:r>
+              <a:rPr lang="en-US" dirty="0" smtClean="0"/>
+              <a:t>Goals</a:t>
+            </a:r>
+          </a:p>
+          <a:p>
+            <a:pPr lvl="1">
+              <a:lnSpc>
+                <a:spcPct val="90000"/>
+              </a:lnSpc>
+            </a:pPr>
+            <a:r>
+              <a:rPr lang="en-US" dirty="0" smtClean="0"/>
+              <a:t>Better model fitting</a:t>
+            </a:r>
+          </a:p>
+          <a:p>
+            <a:pPr lvl="2">
+              <a:lnSpc>
+                <a:spcPct val="90000"/>
+              </a:lnSpc>
+            </a:pPr>
+            <a:r>
+              <a:rPr lang="en-US" dirty="0" smtClean="0"/>
+              <a:t>Reduce correlation among parameters &amp; scale difference</a:t>
+            </a:r>
+          </a:p>
+          <a:p>
+            <a:pPr lvl="1">
+              <a:lnSpc>
+                <a:spcPct val="90000"/>
+              </a:lnSpc>
+            </a:pPr>
+            <a:r>
+              <a:rPr lang="en-US" dirty="0" smtClean="0"/>
+              <a:t>Easier interpretation</a:t>
+            </a:r>
+          </a:p>
+        </p:txBody>
+      </p:sp>
     </p:spTree>
     <p:extLst>
       <p:ext uri="{BB962C8B-B14F-4D97-AF65-F5344CB8AC3E}">
-        <p14:creationId xmlns:p14="http://schemas.microsoft.com/office/powerpoint/2010/main" val="677386688"/>
+        <p14:creationId xmlns:p14="http://schemas.microsoft.com/office/powerpoint/2010/main" val="3253704358"/>
       </p:ext>
     </p:extLst>
   </p:cSld>
@@ -4257,9 +4326,84 @@
   <p:timing>
     <p:tnLst>
       <p:par>
-        <p:cTn id="1" dur="indefinite" restart="never" nodeType="tmRoot"/>
+        <p:cTn id="1" dur="indefinite" restart="never" nodeType="tmRoot">
+          <p:childTnLst>
+            <p:seq concurrent="1" nextAc="seek">
+              <p:cTn id="2" dur="indefinite" nodeType="mainSeq">
+                <p:childTnLst>
+                  <p:par>
+                    <p:cTn id="3" fill="hold">
+                      <p:stCondLst>
+                        <p:cond delay="indefinite"/>
+                      </p:stCondLst>
+                      <p:childTnLst>
+                        <p:par>
+                          <p:cTn id="4" fill="hold">
+                            <p:stCondLst>
+                              <p:cond delay="0"/>
+                            </p:stCondLst>
+                            <p:childTnLst>
+                              <p:par>
+                                <p:cTn id="5" presetID="1" presetClass="entr" presetSubtype="0" fill="hold" grpId="0" nodeType="clickEffect">
+                                  <p:stCondLst>
+                                    <p:cond delay="0"/>
+                                  </p:stCondLst>
+                                  <p:childTnLst>
+                                    <p:set>
+                                      <p:cBhvr>
+                                        <p:cTn id="6" dur="1" fill="hold">
+                                          <p:stCondLst>
+                                            <p:cond delay="0"/>
+                                          </p:stCondLst>
+                                        </p:cTn>
+                                        <p:tgtEl>
+                                          <p:spTgt spid="418819">
+                                            <p:txEl>
+                                              <p:pRg st="5" end="5"/>
+                                            </p:txEl>
+                                          </p:spTgt>
+                                        </p:tgtEl>
+                                        <p:attrNameLst>
+                                          <p:attrName>style.visibility</p:attrName>
+                                        </p:attrNameLst>
+                                      </p:cBhvr>
+                                      <p:to>
+                                        <p:strVal val="visible"/>
+                                      </p:to>
+                                    </p:set>
+                                  </p:childTnLst>
+                                </p:cTn>
+                              </p:par>
+                            </p:childTnLst>
+                          </p:cTn>
+                        </p:par>
+                      </p:childTnLst>
+                    </p:cTn>
+                  </p:par>
+                </p:childTnLst>
+              </p:cTn>
+              <p:prevCondLst>
+                <p:cond evt="onPrev" delay="0">
+                  <p:tgtEl>
+                    <p:sldTgt/>
+                  </p:tgtEl>
+                </p:cond>
+              </p:prevCondLst>
+              <p:nextCondLst>
+                <p:cond evt="onNext" delay="0">
+                  <p:tgtEl>
+                    <p:sldTgt/>
+                  </p:tgtEl>
+                </p:cond>
+              </p:nextCondLst>
+            </p:seq>
+          </p:childTnLst>
+        </p:cTn>
       </p:par>
     </p:tnLst>
+    <p:bldLst>
+      <p:bldP spid="418819" grpId="0" uiExpand="1" build="p"/>
+    </p:bldLst>
   </p:timing>
 </p:sld>
 </file>
@@ -5376,21 +5520,10 @@
               </a:lnSpc>
             </a:pPr>
             <a:r>
-              <a:rPr lang="en-US" dirty="0"/>
-              <a:t>e</a:t>
-            </a:r>
-            <a:r>
-              <a:rPr lang="en-US" baseline="30000" dirty="0"/>
-              <a:t>-K</a:t>
-            </a:r>
-            <a:r>
-              <a:rPr lang="en-US" dirty="0"/>
-              <a:t> is constant change in growth </a:t>
-            </a:r>
-            <a:r>
               <a:rPr lang="en-US" dirty="0" smtClean="0"/>
-              <a:t>increment</a:t>
-            </a:r>
+              <a:t>log(2)/K is “half-life”</a:t>
+            </a:r>
+            <a:endParaRPr lang="en-US" dirty="0" smtClean="0"/>
           </a:p>
           <a:p>
             <a:pPr lvl="1">
@@ -6511,6 +6644,121 @@
 </file>
 
 <file path=ppt/slides/slide7.xml><?xml version="1.0" encoding="utf-8"?>
+<p:sld xmlns:a="http://schemas.openxmlformats.org/drawingml/2006/main" xmlns:r="http://schemas.openxmlformats.org/officeDocument/2006/relationships" xmlns:p="http://schemas.openxmlformats.org/presentationml/2006/main">
+  <p:cSld>
+    <p:spTree>
+      <p:nvGrpSpPr>
+        <p:cNvPr id="1" name=""/>
+        <p:cNvGrpSpPr/>
+        <p:nvPr/>
+      </p:nvGrpSpPr>
+      <p:grpSpPr>
+        <a:xfrm>
+          <a:off x="0" y="0"/>
+          <a:ext cx="0" cy="0"/>
+          <a:chOff x="0" y="0"/>
+          <a:chExt cx="0" cy="0"/>
+        </a:xfrm>
+      </p:grpSpPr>
+      <p:sp>
+        <p:nvSpPr>
+          <p:cNvPr id="2" name="Title 1"/>
+          <p:cNvSpPr>
+            <a:spLocks noGrp="1"/>
+          </p:cNvSpPr>
+          <p:nvPr>
+            <p:ph type="title"/>
+          </p:nvPr>
+        </p:nvSpPr>
+        <p:spPr/>
+        <p:txBody>
+          <a:bodyPr/>
+          <a:lstStyle/>
+          <a:p>
+            <a:endParaRPr lang="en-US"/>
+          </a:p>
+        </p:txBody>
+      </p:sp>
+      <p:sp>
+        <p:nvSpPr>
+          <p:cNvPr id="3" name="Content Placeholder 2"/>
+          <p:cNvSpPr>
+            <a:spLocks noGrp="1"/>
+          </p:cNvSpPr>
+          <p:nvPr>
+            <p:ph idx="1"/>
+          </p:nvPr>
+        </p:nvSpPr>
+        <p:spPr/>
+        <p:txBody>
+          <a:bodyPr/>
+          <a:lstStyle/>
+          <a:p>
+            <a:endParaRPr lang="en-US"/>
+          </a:p>
+        </p:txBody>
+      </p:sp>
+      <p:sp>
+        <p:nvSpPr>
+          <p:cNvPr id="4" name="Footer Placeholder 3"/>
+          <p:cNvSpPr>
+            <a:spLocks noGrp="1"/>
+          </p:cNvSpPr>
+          <p:nvPr>
+            <p:ph type="ftr" sz="quarter" idx="10"/>
+          </p:nvPr>
+        </p:nvSpPr>
+        <p:spPr/>
+        <p:txBody>
+          <a:bodyPr/>
+          <a:lstStyle/>
+          <a:p>
+            <a:r>
+              <a:rPr lang="en-US" smtClean="0"/>
+              <a:t>MNAFS 2013 - Growth</a:t>
+            </a:r>
+            <a:endParaRPr lang="en-US"/>
+          </a:p>
+        </p:txBody>
+      </p:sp>
+      <p:sp>
+        <p:nvSpPr>
+          <p:cNvPr id="5" name="Slide Number Placeholder 4"/>
+          <p:cNvSpPr>
+            <a:spLocks noGrp="1"/>
+          </p:cNvSpPr>
+          <p:nvPr>
+            <p:ph type="sldNum" sz="quarter" idx="11"/>
+          </p:nvPr>
+        </p:nvSpPr>
+        <p:spPr/>
+        <p:txBody>
+          <a:bodyPr/>
+          <a:lstStyle/>
+          <a:p>
+            <a:fld id="{ED6950E9-D724-4023-B9C4-CE5A7098C138}" type="slidenum">
+              <a:rPr lang="en-US" smtClean="0"/>
+              <a:pPr/>
+              <a:t>7</a:t>
+            </a:fld>
+            <a:endParaRPr lang="en-US"/>
+          </a:p>
+        </p:txBody>
+      </p:sp>
+    </p:spTree>
+    <p:extLst>
+      <p:ext uri="{BB962C8B-B14F-4D97-AF65-F5344CB8AC3E}">
+        <p14:creationId xmlns:p14="http://schemas.microsoft.com/office/powerpoint/2010/main" val="1629006304"/>
+      </p:ext>
+    </p:extLst>
+  </p:cSld>
+  <p:clrMapOvr>
+    <a:masterClrMapping/>
+  </p:clrMapOvr>
+</p:sld>
+</file>
+
+<file path=ppt/slides/slide8.xml><?xml version="1.0" encoding="utf-8"?>
 <p:sld xmlns:a="http://schemas.openxmlformats.org/drawingml/2006/main" xmlns:r="http://schemas.openxmlformats.org/officeDocument/2006/relationships" xmlns:p="http://schemas.openxmlformats.org/presentationml/2006/main" showMasterSp="0">
   <p:cSld>
     <p:spTree>
@@ -6568,7 +6816,7 @@
             <a:fld id="{4BDAF3FE-F4ED-40E0-8515-1C336F67AAE4}" type="slidenum">
               <a:rPr lang="en-US"/>
               <a:pPr/>
-              <a:t>7</a:t>
+              <a:t>8</a:t>
             </a:fld>
             <a:endParaRPr lang="en-US"/>
           </a:p>
@@ -7084,7 +7332,7 @@
 </p:sld>
 </file>
 
-<file path=ppt/slides/slide8.xml><?xml version="1.0" encoding="utf-8"?>
+<file path=ppt/slides/slide9.xml><?xml version="1.0" encoding="utf-8"?>
 <p:sld xmlns:a="http://schemas.openxmlformats.org/drawingml/2006/main" xmlns:r="http://schemas.openxmlformats.org/officeDocument/2006/relationships" xmlns:p="http://schemas.openxmlformats.org/presentationml/2006/main" showMasterSp="0">
   <p:cSld>
     <p:spTree>
@@ -7142,7 +7390,7 @@
             <a:fld id="{4BDAF3FE-F4ED-40E0-8515-1C336F67AAE4}" type="slidenum">
               <a:rPr lang="en-US"/>
               <a:pPr/>
-              <a:t>8</a:t>
+              <a:t>9</a:t>
             </a:fld>
             <a:endParaRPr lang="en-US"/>
           </a:p>
@@ -7215,285 +7463,6 @@
         <p:cTn id="1" dur="indefinite" restart="never" nodeType="tmRoot"/>
       </p:par>
     </p:tnLst>
-  </p:timing>
-</p:sld>
-</file>
-
-<file path=ppt/slides/slide9.xml><?xml version="1.0" encoding="utf-8"?>
-<p:sld xmlns:a="http://schemas.openxmlformats.org/drawingml/2006/main" xmlns:r="http://schemas.openxmlformats.org/officeDocument/2006/relationships" xmlns:p="http://schemas.openxmlformats.org/presentationml/2006/main" showMasterSp="0">
-  <p:cSld>
-    <p:spTree>
-      <p:nvGrpSpPr>
-        <p:cNvPr id="1" name=""/>
-        <p:cNvGrpSpPr/>
-        <p:nvPr/>
-      </p:nvGrpSpPr>
-      <p:grpSpPr>
-        <a:xfrm>
-          <a:off x="0" y="0"/>
-          <a:ext cx="0" cy="0"/>
-          <a:chOff x="0" y="0"/>
-          <a:chExt cx="0" cy="0"/>
-        </a:xfrm>
-      </p:grpSpPr>
-      <p:sp>
-        <p:nvSpPr>
-          <p:cNvPr id="5" name="Footer Placeholder 3"/>
-          <p:cNvSpPr>
-            <a:spLocks noGrp="1"/>
-          </p:cNvSpPr>
-          <p:nvPr>
-            <p:ph type="ftr" sz="quarter" idx="10"/>
-          </p:nvPr>
-        </p:nvSpPr>
-        <p:spPr/>
-        <p:txBody>
-          <a:bodyPr/>
-          <a:lstStyle/>
-          <a:p>
-            <a:r>
-              <a:rPr lang="en-US" smtClean="0"/>
-              <a:t>MNAFS 2013 - Growth</a:t>
-            </a:r>
-            <a:endParaRPr lang="en-US"/>
-          </a:p>
-        </p:txBody>
-      </p:sp>
-      <p:sp>
-        <p:nvSpPr>
-          <p:cNvPr id="6" name="Slide Number Placeholder 4"/>
-          <p:cNvSpPr>
-            <a:spLocks noGrp="1"/>
-          </p:cNvSpPr>
-          <p:nvPr>
-            <p:ph type="sldNum" sz="quarter" idx="11"/>
-          </p:nvPr>
-        </p:nvSpPr>
-        <p:spPr/>
-        <p:txBody>
-          <a:bodyPr/>
-          <a:lstStyle/>
-          <a:p>
-            <a:fld id="{4BDAF3FE-F4ED-40E0-8515-1C336F67AAE4}" type="slidenum">
-              <a:rPr lang="en-US"/>
-              <a:pPr/>
-              <a:t>9</a:t>
-            </a:fld>
-            <a:endParaRPr lang="en-US"/>
-          </a:p>
-        </p:txBody>
-      </p:sp>
-      <p:sp>
-        <p:nvSpPr>
-          <p:cNvPr id="418818" name="Rectangle 2"/>
-          <p:cNvSpPr>
-            <a:spLocks noGrp="1" noChangeArrowheads="1"/>
-          </p:cNvSpPr>
-          <p:nvPr>
-            <p:ph type="title"/>
-          </p:nvPr>
-        </p:nvSpPr>
-        <p:spPr/>
-        <p:txBody>
-          <a:bodyPr/>
-          <a:lstStyle/>
-          <a:p>
-            <a:r>
-              <a:rPr lang="en-US" dirty="0"/>
-              <a:t>Von Bertalanffy </a:t>
-            </a:r>
-            <a:r>
-              <a:rPr lang="en-US" dirty="0" smtClean="0"/>
-              <a:t>– Francis</a:t>
-            </a:r>
-            <a:endParaRPr lang="en-US" dirty="0"/>
-          </a:p>
-        </p:txBody>
-      </p:sp>
-      <p:sp>
-        <p:nvSpPr>
-          <p:cNvPr id="418819" name="Rectangle 3"/>
-          <p:cNvSpPr>
-            <a:spLocks noGrp="1" noChangeArrowheads="1"/>
-          </p:cNvSpPr>
-          <p:nvPr>
-            <p:ph type="body" idx="1"/>
-          </p:nvPr>
-        </p:nvSpPr>
-        <p:spPr>
-          <a:xfrm>
-            <a:off x="65088" y="1066800"/>
-            <a:ext cx="9078912" cy="5562600"/>
-          </a:xfrm>
-        </p:spPr>
-        <p:txBody>
-          <a:bodyPr/>
-          <a:lstStyle/>
-          <a:p>
-            <a:pPr>
-              <a:lnSpc>
-                <a:spcPct val="90000"/>
-              </a:lnSpc>
-            </a:pPr>
-            <a:r>
-              <a:rPr lang="en-US" dirty="0"/>
-              <a:t> </a:t>
-            </a:r>
-            <a:r>
-              <a:rPr lang="en-US" dirty="0" smtClean="0"/>
-              <a:t>A </a:t>
-            </a:r>
-            <a:r>
-              <a:rPr lang="en-US" dirty="0" err="1" smtClean="0"/>
-              <a:t>reparameterization</a:t>
-            </a:r>
-            <a:endParaRPr lang="en-US" dirty="0" smtClean="0"/>
-          </a:p>
-          <a:p>
-            <a:pPr>
-              <a:lnSpc>
-                <a:spcPct val="90000"/>
-              </a:lnSpc>
-            </a:pPr>
-            <a:endParaRPr lang="en-US" dirty="0"/>
-          </a:p>
-          <a:p>
-            <a:pPr>
-              <a:lnSpc>
-                <a:spcPct val="90000"/>
-              </a:lnSpc>
-            </a:pPr>
-            <a:r>
-              <a:rPr lang="en-US" dirty="0" smtClean="0"/>
-              <a:t>Goals</a:t>
-            </a:r>
-          </a:p>
-          <a:p>
-            <a:pPr lvl="1">
-              <a:lnSpc>
-                <a:spcPct val="90000"/>
-              </a:lnSpc>
-            </a:pPr>
-            <a:r>
-              <a:rPr lang="en-US" dirty="0" smtClean="0"/>
-              <a:t>Better model fitting</a:t>
-            </a:r>
-          </a:p>
-          <a:p>
-            <a:pPr lvl="2">
-              <a:lnSpc>
-                <a:spcPct val="90000"/>
-              </a:lnSpc>
-            </a:pPr>
-            <a:r>
-              <a:rPr lang="en-US" dirty="0" smtClean="0"/>
-              <a:t>Reduce correlation among parameters &amp; scale difference</a:t>
-            </a:r>
-          </a:p>
-          <a:p>
-            <a:pPr lvl="1">
-              <a:lnSpc>
-                <a:spcPct val="90000"/>
-              </a:lnSpc>
-            </a:pPr>
-            <a:r>
-              <a:rPr lang="en-US" dirty="0" smtClean="0"/>
-              <a:t>Easier interpretation</a:t>
-            </a:r>
-          </a:p>
-        </p:txBody>
-      </p:sp>
-    </p:spTree>
-    <p:extLst>
-      <p:ext uri="{BB962C8B-B14F-4D97-AF65-F5344CB8AC3E}">
-        <p14:creationId xmlns:p14="http://schemas.microsoft.com/office/powerpoint/2010/main" val="3253704358"/>
-      </p:ext>
-    </p:extLst>
-  </p:cSld>
-  <p:clrMapOvr>
-    <a:masterClrMapping/>
-  </p:clrMapOvr>
-  <p:timing>
-    <p:tnLst>
-      <p:par>
-        <p:cTn id="1" dur="indefinite" restart="never" nodeType="tmRoot">
-          <p:childTnLst>
-            <p:seq concurrent="1" nextAc="seek">
-              <p:cTn id="2" dur="indefinite" nodeType="mainSeq">
-                <p:childTnLst>
-                  <p:par>
-                    <p:cTn id="3" fill="hold">
-                      <p:stCondLst>
-                        <p:cond delay="indefinite"/>
-                      </p:stCondLst>
-                      <p:childTnLst>
-                        <p:par>
-                          <p:cTn id="4" fill="hold">
-                            <p:stCondLst>
-                              <p:cond delay="0"/>
-                            </p:stCondLst>
-                            <p:childTnLst>
-                              <p:par>
-                                <p:cTn id="5" presetID="1" presetClass="entr" presetSubtype="0" fill="hold" grpId="0" nodeType="clickEffect">
-                                  <p:stCondLst>
-                                    <p:cond delay="0"/>
-                                  </p:stCondLst>
-                                  <p:childTnLst>
-                                    <p:set>
-                                      <p:cBhvr>
-                                        <p:cTn id="6" dur="1" fill="hold">
-                                          <p:stCondLst>
-                                            <p:cond delay="0"/>
-                                          </p:stCondLst>
-                                        </p:cTn>
-                                        <p:tgtEl>
-                                          <p:spTgt spid="418819">
-                                            <p:txEl>
-                                              <p:pRg st="5" end="5"/>
-                                            </p:txEl>
-                                          </p:spTgt>
-                                        </p:tgtEl>
-                                        <p:attrNameLst>
-                                          <p:attrName>style.visibility</p:attrName>
-                                        </p:attrNameLst>
-                                      </p:cBhvr>
-                                      <p:to>
-                                        <p:strVal val="visible"/>
-                                      </p:to>
-                                    </p:set>
-                                  </p:childTnLst>
-                                </p:cTn>
-                              </p:par>
-                            </p:childTnLst>
-                          </p:cTn>
-                        </p:par>
-                      </p:childTnLst>
-                    </p:cTn>
-                  </p:par>
-                </p:childTnLst>
-              </p:cTn>
-              <p:prevCondLst>
-                <p:cond evt="onPrev" delay="0">
-                  <p:tgtEl>
-                    <p:sldTgt/>
-                  </p:tgtEl>
-                </p:cond>
-              </p:prevCondLst>
-              <p:nextCondLst>
-                <p:cond evt="onNext" delay="0">
-                  <p:tgtEl>
-                    <p:sldTgt/>
-                  </p:tgtEl>
-                </p:cond>
-              </p:nextCondLst>
-            </p:seq>
-          </p:childTnLst>
-        </p:cTn>
-      </p:par>
-    </p:tnLst>
-    <p:bldLst>
-      <p:bldP spid="418819" grpId="0" uiExpand="1" build="p"/>
-    </p:bldLst>
   </p:timing>
 </p:sld>
 </file>

</xml_diff>